<commit_message>
Add special ppic for Pop! Team
</commit_message>
<xml_diff>
--- a/art/Account Pictures.pptx
+++ b/art/Account Pictures.pptx
@@ -7,6 +7,7 @@
   <p:sldIdLst>
     <p:sldId id="256" r:id="rId2"/>
     <p:sldId id="257" r:id="rId3"/>
+    <p:sldId id="258" r:id="rId4"/>
   </p:sldIdLst>
   <p:sldSz cx="12192000" cy="6858000"/>
   <p:notesSz cx="6858000" cy="9144000"/>
@@ -273,7 +274,7 @@
           <a:p>
             <a:fld id="{158166F8-09A3-4164-BFAA-AC6619B7E51E}" type="datetimeFigureOut">
               <a:rPr lang="en-GB" smtClean="0"/>
-              <a:t>29/04/2018</a:t>
+              <a:t>30/04/2018</a:t>
             </a:fld>
             <a:endParaRPr lang="en-GB"/>
           </a:p>
@@ -473,7 +474,7 @@
           <a:p>
             <a:fld id="{158166F8-09A3-4164-BFAA-AC6619B7E51E}" type="datetimeFigureOut">
               <a:rPr lang="en-GB" smtClean="0"/>
-              <a:t>29/04/2018</a:t>
+              <a:t>30/04/2018</a:t>
             </a:fld>
             <a:endParaRPr lang="en-GB"/>
           </a:p>
@@ -683,7 +684,7 @@
           <a:p>
             <a:fld id="{158166F8-09A3-4164-BFAA-AC6619B7E51E}" type="datetimeFigureOut">
               <a:rPr lang="en-GB" smtClean="0"/>
-              <a:t>29/04/2018</a:t>
+              <a:t>30/04/2018</a:t>
             </a:fld>
             <a:endParaRPr lang="en-GB"/>
           </a:p>
@@ -883,7 +884,7 @@
           <a:p>
             <a:fld id="{158166F8-09A3-4164-BFAA-AC6619B7E51E}" type="datetimeFigureOut">
               <a:rPr lang="en-GB" smtClean="0"/>
-              <a:t>29/04/2018</a:t>
+              <a:t>30/04/2018</a:t>
             </a:fld>
             <a:endParaRPr lang="en-GB"/>
           </a:p>
@@ -1159,7 +1160,7 @@
           <a:p>
             <a:fld id="{158166F8-09A3-4164-BFAA-AC6619B7E51E}" type="datetimeFigureOut">
               <a:rPr lang="en-GB" smtClean="0"/>
-              <a:t>29/04/2018</a:t>
+              <a:t>30/04/2018</a:t>
             </a:fld>
             <a:endParaRPr lang="en-GB"/>
           </a:p>
@@ -1427,7 +1428,7 @@
           <a:p>
             <a:fld id="{158166F8-09A3-4164-BFAA-AC6619B7E51E}" type="datetimeFigureOut">
               <a:rPr lang="en-GB" smtClean="0"/>
-              <a:t>29/04/2018</a:t>
+              <a:t>30/04/2018</a:t>
             </a:fld>
             <a:endParaRPr lang="en-GB"/>
           </a:p>
@@ -1842,7 +1843,7 @@
           <a:p>
             <a:fld id="{158166F8-09A3-4164-BFAA-AC6619B7E51E}" type="datetimeFigureOut">
               <a:rPr lang="en-GB" smtClean="0"/>
-              <a:t>29/04/2018</a:t>
+              <a:t>30/04/2018</a:t>
             </a:fld>
             <a:endParaRPr lang="en-GB"/>
           </a:p>
@@ -1984,7 +1985,7 @@
           <a:p>
             <a:fld id="{158166F8-09A3-4164-BFAA-AC6619B7E51E}" type="datetimeFigureOut">
               <a:rPr lang="en-GB" smtClean="0"/>
-              <a:t>29/04/2018</a:t>
+              <a:t>30/04/2018</a:t>
             </a:fld>
             <a:endParaRPr lang="en-GB"/>
           </a:p>
@@ -2097,7 +2098,7 @@
           <a:p>
             <a:fld id="{158166F8-09A3-4164-BFAA-AC6619B7E51E}" type="datetimeFigureOut">
               <a:rPr lang="en-GB" smtClean="0"/>
-              <a:t>29/04/2018</a:t>
+              <a:t>30/04/2018</a:t>
             </a:fld>
             <a:endParaRPr lang="en-GB"/>
           </a:p>
@@ -2410,7 +2411,7 @@
           <a:p>
             <a:fld id="{158166F8-09A3-4164-BFAA-AC6619B7E51E}" type="datetimeFigureOut">
               <a:rPr lang="en-GB" smtClean="0"/>
-              <a:t>29/04/2018</a:t>
+              <a:t>30/04/2018</a:t>
             </a:fld>
             <a:endParaRPr lang="en-GB"/>
           </a:p>
@@ -2699,7 +2700,7 @@
           <a:p>
             <a:fld id="{158166F8-09A3-4164-BFAA-AC6619B7E51E}" type="datetimeFigureOut">
               <a:rPr lang="en-GB" smtClean="0"/>
-              <a:t>29/04/2018</a:t>
+              <a:t>30/04/2018</a:t>
             </a:fld>
             <a:endParaRPr lang="en-GB"/>
           </a:p>
@@ -2942,7 +2943,7 @@
           <a:p>
             <a:fld id="{158166F8-09A3-4164-BFAA-AC6619B7E51E}" type="datetimeFigureOut">
               <a:rPr lang="en-GB" smtClean="0"/>
-              <a:t>29/04/2018</a:t>
+              <a:t>30/04/2018</a:t>
             </a:fld>
             <a:endParaRPr lang="en-GB"/>
           </a:p>
@@ -5386,6 +5387,160 @@
 </p:sld>
 </file>
 
+<file path=ppt/slides/slide3.xml><?xml version="1.0" encoding="utf-8"?>
+<p:sld xmlns:a="http://schemas.openxmlformats.org/drawingml/2006/main" xmlns:r="http://schemas.openxmlformats.org/officeDocument/2006/relationships" xmlns:p="http://schemas.openxmlformats.org/presentationml/2006/main">
+  <p:cSld>
+    <p:spTree>
+      <p:nvGrpSpPr>
+        <p:cNvPr id="1" name=""/>
+        <p:cNvGrpSpPr/>
+        <p:nvPr/>
+      </p:nvGrpSpPr>
+      <p:grpSpPr>
+        <a:xfrm>
+          <a:off x="0" y="0"/>
+          <a:ext cx="0" cy="0"/>
+          <a:chOff x="0" y="0"/>
+          <a:chExt cx="0" cy="0"/>
+        </a:xfrm>
+      </p:grpSpPr>
+      <p:grpSp>
+        <p:nvGrpSpPr>
+          <p:cNvPr id="12" name="Group 11">
+            <a:extLst>
+              <a:ext uri="{FF2B5EF4-FFF2-40B4-BE49-F238E27FC236}">
+                <a16:creationId xmlns:a16="http://schemas.microsoft.com/office/drawing/2014/main" id="{1BB83834-7B78-4F3A-81B9-15CB7331DD4F}"/>
+              </a:ext>
+            </a:extLst>
+          </p:cNvPr>
+          <p:cNvGrpSpPr/>
+          <p:nvPr/>
+        </p:nvGrpSpPr>
+        <p:grpSpPr>
+          <a:xfrm>
+            <a:off x="4893985" y="2226985"/>
+            <a:ext cx="2404029" cy="2404029"/>
+            <a:chOff x="345057" y="546340"/>
+            <a:chExt cx="2882660" cy="2882660"/>
+          </a:xfrm>
+        </p:grpSpPr>
+        <p:sp>
+          <p:nvSpPr>
+            <p:cNvPr id="13" name="Oval 12">
+              <a:extLst>
+                <a:ext uri="{FF2B5EF4-FFF2-40B4-BE49-F238E27FC236}">
+                  <a16:creationId xmlns:a16="http://schemas.microsoft.com/office/drawing/2014/main" id="{0BDEBC4D-09F4-4019-9972-2FE6B04875CE}"/>
+                </a:ext>
+              </a:extLst>
+            </p:cNvPr>
+            <p:cNvSpPr/>
+            <p:nvPr/>
+          </p:nvSpPr>
+          <p:spPr>
+            <a:xfrm>
+              <a:off x="345057" y="546340"/>
+              <a:ext cx="2882660" cy="2882660"/>
+            </a:xfrm>
+            <a:prstGeom prst="ellipse">
+              <a:avLst/>
+            </a:prstGeom>
+            <a:solidFill>
+              <a:schemeClr val="tx1">
+                <a:lumMod val="65000"/>
+                <a:lumOff val="35000"/>
+              </a:schemeClr>
+            </a:solidFill>
+            <a:ln w="190500">
+              <a:solidFill>
+                <a:schemeClr val="tx1"/>
+              </a:solidFill>
+            </a:ln>
+          </p:spPr>
+          <p:style>
+            <a:lnRef idx="2">
+              <a:schemeClr val="accent1">
+                <a:shade val="50000"/>
+              </a:schemeClr>
+            </a:lnRef>
+            <a:fillRef idx="1">
+              <a:schemeClr val="accent1"/>
+            </a:fillRef>
+            <a:effectRef idx="0">
+              <a:schemeClr val="accent1"/>
+            </a:effectRef>
+            <a:fontRef idx="minor">
+              <a:schemeClr val="lt1"/>
+            </a:fontRef>
+          </p:style>
+          <p:txBody>
+            <a:bodyPr rtlCol="0" anchor="ctr"/>
+            <a:lstStyle/>
+            <a:p>
+              <a:pPr algn="ctr"/>
+              <a:endParaRPr lang="en-GB"/>
+            </a:p>
+          </p:txBody>
+        </p:sp>
+        <p:pic>
+          <p:nvPicPr>
+            <p:cNvPr id="14" name="Picture 2">
+              <a:extLst>
+                <a:ext uri="{FF2B5EF4-FFF2-40B4-BE49-F238E27FC236}">
+                  <a16:creationId xmlns:a16="http://schemas.microsoft.com/office/drawing/2014/main" id="{C82DE771-D5C7-4D2A-B54A-D7CF2E91FC68}"/>
+                </a:ext>
+              </a:extLst>
+            </p:cNvPr>
+            <p:cNvPicPr>
+              <a:picLocks noChangeAspect="1" noChangeArrowheads="1"/>
+            </p:cNvPicPr>
+            <p:nvPr/>
+          </p:nvPicPr>
+          <p:blipFill>
+            <a:blip r:embed="rId2">
+              <a:extLst>
+                <a:ext uri="{28A0092B-C50C-407E-A947-70E740481C1C}">
+                  <a14:useLocalDpi xmlns:a14="http://schemas.microsoft.com/office/drawing/2010/main" val="0"/>
+                </a:ext>
+              </a:extLst>
+            </a:blip>
+            <a:stretch>
+              <a:fillRect/>
+            </a:stretch>
+          </p:blipFill>
+          <p:spPr bwMode="auto">
+            <a:xfrm>
+              <a:off x="647102" y="770179"/>
+              <a:ext cx="2278568" cy="2434980"/>
+            </a:xfrm>
+            <a:prstGeom prst="rect">
+              <a:avLst/>
+            </a:prstGeom>
+            <a:noFill/>
+            <a:extLst>
+              <a:ext uri="{909E8E84-426E-40DD-AFC4-6F175D3DCCD1}">
+                <a14:hiddenFill xmlns:a14="http://schemas.microsoft.com/office/drawing/2010/main">
+                  <a:solidFill>
+                    <a:srgbClr val="FFFFFF"/>
+                  </a:solidFill>
+                </a14:hiddenFill>
+              </a:ext>
+            </a:extLst>
+          </p:spPr>
+        </p:pic>
+      </p:grpSp>
+    </p:spTree>
+    <p:extLst>
+      <p:ext uri="{BB962C8B-B14F-4D97-AF65-F5344CB8AC3E}">
+        <p14:creationId xmlns:p14="http://schemas.microsoft.com/office/powerpoint/2010/main" val="3036071357"/>
+      </p:ext>
+    </p:extLst>
+  </p:cSld>
+  <p:clrMapOvr>
+    <a:masterClrMapping/>
+  </p:clrMapOvr>
+</p:sld>
+</file>
+
 <file path=ppt/theme/theme1.xml><?xml version="1.0" encoding="utf-8"?>
 <a:theme xmlns:a="http://schemas.openxmlformats.org/drawingml/2006/main" name="Office Theme">
   <a:themeElements>

</xml_diff>

<commit_message>
Add loading image to ppic for loading only
</commit_message>
<xml_diff>
--- a/art/Account Pictures.pptx
+++ b/art/Account Pictures.pptx
@@ -5418,7 +5418,7 @@
         </p:nvGrpSpPr>
         <p:grpSpPr>
           <a:xfrm>
-            <a:off x="4893985" y="2226985"/>
+            <a:off x="2886906" y="2226985"/>
             <a:ext cx="2404029" cy="2404029"/>
             <a:chOff x="345057" y="546340"/>
             <a:chExt cx="2882660" cy="2882660"/>
@@ -5511,6 +5511,137 @@
             <a:xfrm>
               <a:off x="647102" y="770179"/>
               <a:ext cx="2278568" cy="2434980"/>
+            </a:xfrm>
+            <a:prstGeom prst="rect">
+              <a:avLst/>
+            </a:prstGeom>
+            <a:noFill/>
+            <a:extLst>
+              <a:ext uri="{909E8E84-426E-40DD-AFC4-6F175D3DCCD1}">
+                <a14:hiddenFill xmlns:a14="http://schemas.microsoft.com/office/drawing/2010/main">
+                  <a:solidFill>
+                    <a:srgbClr val="FFFFFF"/>
+                  </a:solidFill>
+                </a14:hiddenFill>
+              </a:ext>
+            </a:extLst>
+          </p:spPr>
+        </p:pic>
+      </p:grpSp>
+      <p:grpSp>
+        <p:nvGrpSpPr>
+          <p:cNvPr id="30" name="Group 29">
+            <a:extLst>
+              <a:ext uri="{FF2B5EF4-FFF2-40B4-BE49-F238E27FC236}">
+                <a16:creationId xmlns:a16="http://schemas.microsoft.com/office/drawing/2014/main" id="{DE570F73-B5D4-45BA-9A1B-417BCAB04855}"/>
+              </a:ext>
+            </a:extLst>
+          </p:cNvPr>
+          <p:cNvGrpSpPr/>
+          <p:nvPr/>
+        </p:nvGrpSpPr>
+        <p:grpSpPr>
+          <a:xfrm>
+            <a:off x="6901067" y="2226983"/>
+            <a:ext cx="2404029" cy="2404029"/>
+            <a:chOff x="345057" y="546340"/>
+            <a:chExt cx="2882660" cy="2882660"/>
+          </a:xfrm>
+        </p:grpSpPr>
+        <p:sp>
+          <p:nvSpPr>
+            <p:cNvPr id="31" name="Oval 30">
+              <a:extLst>
+                <a:ext uri="{FF2B5EF4-FFF2-40B4-BE49-F238E27FC236}">
+                  <a16:creationId xmlns:a16="http://schemas.microsoft.com/office/drawing/2014/main" id="{39DAA46A-6175-4370-BE81-2359EB959241}"/>
+                </a:ext>
+              </a:extLst>
+            </p:cNvPr>
+            <p:cNvSpPr/>
+            <p:nvPr/>
+          </p:nvSpPr>
+          <p:spPr>
+            <a:xfrm>
+              <a:off x="345057" y="546340"/>
+              <a:ext cx="2882660" cy="2882660"/>
+            </a:xfrm>
+            <a:prstGeom prst="ellipse">
+              <a:avLst/>
+            </a:prstGeom>
+            <a:solidFill>
+              <a:schemeClr val="accent3">
+                <a:lumMod val="40000"/>
+                <a:lumOff val="60000"/>
+              </a:schemeClr>
+            </a:solidFill>
+            <a:ln w="190500">
+              <a:solidFill>
+                <a:schemeClr val="accent3"/>
+              </a:solidFill>
+            </a:ln>
+          </p:spPr>
+          <p:style>
+            <a:lnRef idx="2">
+              <a:schemeClr val="accent1">
+                <a:shade val="50000"/>
+              </a:schemeClr>
+            </a:lnRef>
+            <a:fillRef idx="1">
+              <a:schemeClr val="accent1"/>
+            </a:fillRef>
+            <a:effectRef idx="0">
+              <a:schemeClr val="accent1"/>
+            </a:effectRef>
+            <a:fontRef idx="minor">
+              <a:schemeClr val="lt1"/>
+            </a:fontRef>
+          </p:style>
+          <p:txBody>
+            <a:bodyPr rtlCol="0" anchor="ctr"/>
+            <a:lstStyle/>
+            <a:p>
+              <a:pPr algn="ctr"/>
+              <a:endParaRPr lang="en-GB" dirty="0"/>
+            </a:p>
+          </p:txBody>
+        </p:sp>
+        <p:pic>
+          <p:nvPicPr>
+            <p:cNvPr id="32" name="Picture 2">
+              <a:extLst>
+                <a:ext uri="{FF2B5EF4-FFF2-40B4-BE49-F238E27FC236}">
+                  <a16:creationId xmlns:a16="http://schemas.microsoft.com/office/drawing/2014/main" id="{034C7BEF-57C3-4E60-86AF-D6FA61711A95}"/>
+                </a:ext>
+              </a:extLst>
+            </p:cNvPr>
+            <p:cNvPicPr>
+              <a:picLocks noChangeAspect="1" noChangeArrowheads="1"/>
+            </p:cNvPicPr>
+            <p:nvPr/>
+          </p:nvPicPr>
+          <p:blipFill>
+            <a:blip r:embed="rId3">
+              <a:duotone>
+                <a:prstClr val="black"/>
+                <a:schemeClr val="accent3">
+                  <a:tint val="45000"/>
+                  <a:satMod val="400000"/>
+                </a:schemeClr>
+              </a:duotone>
+              <a:extLst>
+                <a:ext uri="{28A0092B-C50C-407E-A947-70E740481C1C}">
+                  <a14:useLocalDpi xmlns:a14="http://schemas.microsoft.com/office/drawing/2010/main" val="0"/>
+                </a:ext>
+              </a:extLst>
+            </a:blip>
+            <a:stretch>
+              <a:fillRect/>
+            </a:stretch>
+          </p:blipFill>
+          <p:spPr bwMode="auto">
+            <a:xfrm>
+              <a:off x="780196" y="981479"/>
+              <a:ext cx="2012381" cy="2012381"/>
             </a:xfrm>
             <a:prstGeom prst="rect">
               <a:avLst/>

</xml_diff>